<commit_message>
format simple-degree.pptx stable-matching.pptx link in simple_graphs
</commit_message>
<xml_diff>
--- a/spring13/slides13/simple-degrees.pptx
+++ b/spring13/slides13/simple-degrees.pptx
@@ -3925,7 +3925,7 @@
           <a:graphicData uri="http://schemas.openxmlformats.org/presentationml/2006/ole">
             <mc:AlternateContent xmlns:mc="http://schemas.openxmlformats.org/markup-compatibility/2006">
               <mc:Choice xmlns:v="urn:schemas-microsoft-com:vml" Requires="v">
-                <p:oleObj spid="_x0000_s576555" name="Equation" r:id="rId4" imgW="1346040" imgH="406080" progId="Equation.DSMT4">
+                <p:oleObj spid="_x0000_s576558" name="Equation" r:id="rId4" imgW="1346040" imgH="406080" progId="Equation.DSMT4">
                   <p:embed/>
                 </p:oleObj>
               </mc:Choice>
@@ -4055,7 +4055,7 @@
   <p:clrMapOvr>
     <a:masterClrMapping/>
   </p:clrMapOvr>
-  <p:transition xmlns:p14="http://schemas.microsoft.com/office/powerpoint/2010/main" spd="slow">
+  <p:transition xmlns:p14="http://schemas.microsoft.com/office/powerpoint/2010/main" spd="slow" advClick="0">
     <p:fade/>
   </p:transition>
   <p:timing>
@@ -4290,9 +4290,18 @@
   <p:clrMapOvr>
     <a:masterClrMapping/>
   </p:clrMapOvr>
-  <p:transition xmlns:p14="http://schemas.microsoft.com/office/powerpoint/2010/main">
-    <p:fade thruBlk="1"/>
-  </p:transition>
+  <mc:AlternateContent xmlns:mc="http://schemas.openxmlformats.org/markup-compatibility/2006">
+    <mc:Choice xmlns:p14="http://schemas.microsoft.com/office/powerpoint/2010/main" Requires="p14">
+      <p:transition spd="slow" p14:dur="1100" advClick="0">
+        <p:fade thruBlk="1"/>
+      </p:transition>
+    </mc:Choice>
+    <mc:Fallback>
+      <p:transition xmlns:p14="http://schemas.microsoft.com/office/powerpoint/2010/main" spd="slow" advClick="0">
+        <p:fade thruBlk="1"/>
+      </p:transition>
+    </mc:Fallback>
+  </mc:AlternateContent>
   <p:timing>
     <p:tnLst>
       <p:par>
@@ -5561,7 +5570,7 @@
   <p:clrMapOvr>
     <a:masterClrMapping/>
   </p:clrMapOvr>
-  <p:transition xmlns:p14="http://schemas.microsoft.com/office/powerpoint/2010/main">
+  <p:transition xmlns:p14="http://schemas.microsoft.com/office/powerpoint/2010/main" spd="slow" advClick="0">
     <p:fade thruBlk="1"/>
   </p:transition>
   <p:timing>
@@ -5733,7 +5742,7 @@
           <a:graphicData uri="http://schemas.openxmlformats.org/presentationml/2006/ole">
             <mc:AlternateContent xmlns:mc="http://schemas.openxmlformats.org/markup-compatibility/2006">
               <mc:Choice xmlns:v="urn:schemas-microsoft-com:vml" Requires="v">
-                <p:oleObj spid="_x0000_s1110" name="Equation" r:id="rId4" imgW="1777680" imgH="342720" progId="Equation.DSMT4">
+                <p:oleObj spid="_x0000_s1119" name="Equation" r:id="rId4" imgW="1777680" imgH="342720" progId="Equation.DSMT4">
                   <p:embed/>
                 </p:oleObj>
               </mc:Choice>
@@ -5869,7 +5878,7 @@
           <a:graphicData uri="http://schemas.openxmlformats.org/presentationml/2006/ole">
             <mc:AlternateContent xmlns:mc="http://schemas.openxmlformats.org/markup-compatibility/2006">
               <mc:Choice xmlns:v="urn:schemas-microsoft-com:vml" Requires="v">
-                <p:oleObj spid="_x0000_s1111" name="Equation" r:id="rId6" imgW="1828800" imgH="571320" progId="Equation.DSMT4">
+                <p:oleObj spid="_x0000_s1120" name="Equation" r:id="rId6" imgW="1828800" imgH="571320" progId="Equation.DSMT4">
                   <p:embed/>
                 </p:oleObj>
               </mc:Choice>
@@ -5945,7 +5954,7 @@
           <a:graphicData uri="http://schemas.openxmlformats.org/presentationml/2006/ole">
             <mc:AlternateContent xmlns:mc="http://schemas.openxmlformats.org/markup-compatibility/2006">
               <mc:Choice xmlns:v="urn:schemas-microsoft-com:vml" Requires="v">
-                <p:oleObj spid="_x0000_s1112" name="Equation" r:id="rId8" imgW="660400" imgH="419100" progId="Equation.DSMT4">
+                <p:oleObj spid="_x0000_s1121" name="Equation" r:id="rId8" imgW="660400" imgH="419100" progId="Equation.DSMT4">
                   <p:embed/>
                 </p:oleObj>
               </mc:Choice>
@@ -6015,7 +6024,7 @@
           <a:graphicData uri="http://schemas.openxmlformats.org/presentationml/2006/ole">
             <mc:AlternateContent xmlns:mc="http://schemas.openxmlformats.org/markup-compatibility/2006">
               <mc:Choice xmlns:v="urn:schemas-microsoft-com:vml" Requires="v">
-                <p:oleObj spid="_x0000_s1113" name="Equation" r:id="rId10" imgW="660400" imgH="419100" progId="Equation.DSMT4">
+                <p:oleObj spid="_x0000_s1122" name="Equation" r:id="rId10" imgW="660400" imgH="419100" progId="Equation.DSMT4">
                   <p:embed/>
                 </p:oleObj>
               </mc:Choice>
@@ -6073,14 +6082,14 @@
   <p:clrMapOvr>
     <a:masterClrMapping/>
   </p:clrMapOvr>
-  <mc:AlternateContent xmlns:mc="http://schemas.openxmlformats.org/markup-compatibility/2006" xmlns:p14="http://schemas.microsoft.com/office/powerpoint/2010/main">
-    <mc:Choice Requires="p14">
-      <p:transition spd="med" p14:dur="700">
+  <mc:AlternateContent xmlns:mc="http://schemas.openxmlformats.org/markup-compatibility/2006">
+    <mc:Choice xmlns:p14="http://schemas.microsoft.com/office/powerpoint/2010/main" Requires="p14">
+      <p:transition spd="slow" p14:dur="900" advClick="0">
         <p:fade/>
       </p:transition>
     </mc:Choice>
-    <mc:Fallback xmlns="">
-      <p:transition xmlns:p14="http://schemas.microsoft.com/office/powerpoint/2010/main" spd="med">
+    <mc:Fallback>
+      <p:transition xmlns:p14="http://schemas.microsoft.com/office/powerpoint/2010/main" spd="slow" advClick="0">
         <p:fade/>
       </p:transition>
     </mc:Fallback>
@@ -6450,7 +6459,7 @@
           <a:graphicData uri="http://schemas.openxmlformats.org/presentationml/2006/ole">
             <mc:AlternateContent xmlns:mc="http://schemas.openxmlformats.org/markup-compatibility/2006">
               <mc:Choice xmlns:v="urn:schemas-microsoft-com:vml" Requires="v">
-                <p:oleObj spid="_x0000_s655397" name="Equation" r:id="rId4" imgW="2273040" imgH="469800" progId="Equation.DSMT4">
+                <p:oleObj spid="_x0000_s655400" name="Equation" r:id="rId4" imgW="2273040" imgH="469800" progId="Equation.DSMT4">
                   <p:embed/>
                 </p:oleObj>
               </mc:Choice>
@@ -6770,7 +6779,7 @@
   <p:clrMapOvr>
     <a:masterClrMapping/>
   </p:clrMapOvr>
-  <p:transition xmlns:p14="http://schemas.microsoft.com/office/powerpoint/2010/main" spd="slow">
+  <p:transition xmlns:p14="http://schemas.microsoft.com/office/powerpoint/2010/main" spd="slow" advClick="0">
     <p:fade/>
   </p:transition>
   <p:timing>
@@ -7239,13 +7248,18 @@
             <p:ph type="title"/>
           </p:nvPr>
         </p:nvSpPr>
-        <p:spPr/>
+        <p:spPr>
+          <a:xfrm>
+            <a:off x="2578568" y="0"/>
+            <a:ext cx="4754028" cy="1035171"/>
+          </a:xfrm>
+        </p:spPr>
         <p:txBody>
           <a:bodyPr/>
           <a:lstStyle/>
           <a:p>
             <a:r>
-              <a:rPr lang="en-US" sz="3600"/>
+              <a:rPr lang="en-US" sz="3600" dirty="0"/>
               <a:t>Types of Graphs</a:t>
             </a:r>
           </a:p>
@@ -8808,7 +8822,7 @@
                             </p:stCondLst>
                             <p:childTnLst>
                               <p:par>
-                                <p:cTn id="22" presetID="9" presetClass="entr" presetSubtype="0" fill="hold" nodeType="clickEffect">
+                                <p:cTn id="22" presetID="22" presetClass="entr" presetSubtype="2" fill="hold" nodeType="clickEffect">
                                   <p:stCondLst>
                                     <p:cond delay="0"/>
                                   </p:stCondLst>
@@ -8821,7 +8835,7 @@
                                           </p:stCondLst>
                                         </p:cTn>
                                         <p:tgtEl>
-                                          <p:spTgt spid="560170"/>
+                                          <p:spTgt spid="2"/>
                                         </p:tgtEl>
                                         <p:attrNameLst>
                                           <p:attrName>style.visibility</p:attrName>
@@ -8831,11 +8845,11 @@
                                         <p:strVal val="visible"/>
                                       </p:to>
                                     </p:set>
-                                    <p:animEffect transition="in" filter="dissolve">
+                                    <p:animEffect transition="in" filter="wipe(right)">
                                       <p:cBhvr>
-                                        <p:cTn id="24" dur="500"/>
+                                        <p:cTn id="24" dur="1000"/>
                                         <p:tgtEl>
-                                          <p:spTgt spid="560170"/>
+                                          <p:spTgt spid="2"/>
                                         </p:tgtEl>
                                       </p:cBhvr>
                                     </p:animEffect>
@@ -8861,7 +8875,7 @@
                             </p:stCondLst>
                             <p:childTnLst>
                               <p:par>
-                                <p:cTn id="27" presetID="22" presetClass="entr" presetSubtype="1" fill="hold" nodeType="clickEffect">
+                                <p:cTn id="27" presetID="9" presetClass="entr" presetSubtype="0" fill="hold" nodeType="clickEffect">
                                   <p:stCondLst>
                                     <p:cond delay="0"/>
                                   </p:stCondLst>
@@ -8869,6 +8883,59 @@
                                     <p:set>
                                       <p:cBhvr>
                                         <p:cTn id="28" dur="1" fill="hold">
+                                          <p:stCondLst>
+                                            <p:cond delay="0"/>
+                                          </p:stCondLst>
+                                        </p:cTn>
+                                        <p:tgtEl>
+                                          <p:spTgt spid="560170"/>
+                                        </p:tgtEl>
+                                        <p:attrNameLst>
+                                          <p:attrName>style.visibility</p:attrName>
+                                        </p:attrNameLst>
+                                      </p:cBhvr>
+                                      <p:to>
+                                        <p:strVal val="visible"/>
+                                      </p:to>
+                                    </p:set>
+                                    <p:animEffect transition="in" filter="dissolve">
+                                      <p:cBhvr>
+                                        <p:cTn id="29" dur="500"/>
+                                        <p:tgtEl>
+                                          <p:spTgt spid="560170"/>
+                                        </p:tgtEl>
+                                      </p:cBhvr>
+                                    </p:animEffect>
+                                  </p:childTnLst>
+                                </p:cTn>
+                              </p:par>
+                            </p:childTnLst>
+                          </p:cTn>
+                        </p:par>
+                      </p:childTnLst>
+                    </p:cTn>
+                  </p:par>
+                  <p:par>
+                    <p:cTn id="30" fill="hold">
+                      <p:stCondLst>
+                        <p:cond delay="indefinite"/>
+                      </p:stCondLst>
+                      <p:childTnLst>
+                        <p:par>
+                          <p:cTn id="31" fill="hold">
+                            <p:stCondLst>
+                              <p:cond delay="0"/>
+                            </p:stCondLst>
+                            <p:childTnLst>
+                              <p:par>
+                                <p:cTn id="32" presetID="22" presetClass="entr" presetSubtype="1" fill="hold" nodeType="clickEffect">
+                                  <p:stCondLst>
+                                    <p:cond delay="0"/>
+                                  </p:stCondLst>
+                                  <p:childTnLst>
+                                    <p:set>
+                                      <p:cBhvr>
+                                        <p:cTn id="33" dur="1" fill="hold">
                                           <p:stCondLst>
                                             <p:cond delay="0"/>
                                           </p:stCondLst>
@@ -8886,7 +8953,7 @@
                                     </p:set>
                                     <p:animEffect transition="in" filter="wipe(up)">
                                       <p:cBhvr>
-                                        <p:cTn id="29" dur="500"/>
+                                        <p:cTn id="34" dur="500"/>
                                         <p:tgtEl>
                                           <p:spTgt spid="3"/>
                                         </p:tgtEl>
@@ -8896,14 +8963,14 @@
                                 </p:cTn>
                               </p:par>
                               <p:par>
-                                <p:cTn id="30" presetID="22" presetClass="entr" presetSubtype="1" fill="hold" nodeType="withEffect">
+                                <p:cTn id="35" presetID="22" presetClass="entr" presetSubtype="1" fill="hold" nodeType="withEffect">
                                   <p:stCondLst>
                                     <p:cond delay="0"/>
                                   </p:stCondLst>
                                   <p:childTnLst>
                                     <p:set>
                                       <p:cBhvr>
-                                        <p:cTn id="31" dur="1" fill="hold">
+                                        <p:cTn id="36" dur="1" fill="hold">
                                           <p:stCondLst>
                                             <p:cond delay="0"/>
                                           </p:stCondLst>
@@ -8921,62 +8988,9 @@
                                     </p:set>
                                     <p:animEffect transition="in" filter="wipe(up)">
                                       <p:cBhvr>
-                                        <p:cTn id="32" dur="500"/>
+                                        <p:cTn id="37" dur="500"/>
                                         <p:tgtEl>
                                           <p:spTgt spid="43"/>
-                                        </p:tgtEl>
-                                      </p:cBhvr>
-                                    </p:animEffect>
-                                  </p:childTnLst>
-                                </p:cTn>
-                              </p:par>
-                            </p:childTnLst>
-                          </p:cTn>
-                        </p:par>
-                      </p:childTnLst>
-                    </p:cTn>
-                  </p:par>
-                  <p:par>
-                    <p:cTn id="33" fill="hold">
-                      <p:stCondLst>
-                        <p:cond delay="indefinite"/>
-                      </p:stCondLst>
-                      <p:childTnLst>
-                        <p:par>
-                          <p:cTn id="34" fill="hold">
-                            <p:stCondLst>
-                              <p:cond delay="0"/>
-                            </p:stCondLst>
-                            <p:childTnLst>
-                              <p:par>
-                                <p:cTn id="35" presetID="22" presetClass="entr" presetSubtype="2" fill="hold" nodeType="clickEffect">
-                                  <p:stCondLst>
-                                    <p:cond delay="0"/>
-                                  </p:stCondLst>
-                                  <p:childTnLst>
-                                    <p:set>
-                                      <p:cBhvr>
-                                        <p:cTn id="36" dur="1" fill="hold">
-                                          <p:stCondLst>
-                                            <p:cond delay="0"/>
-                                          </p:stCondLst>
-                                        </p:cTn>
-                                        <p:tgtEl>
-                                          <p:spTgt spid="2"/>
-                                        </p:tgtEl>
-                                        <p:attrNameLst>
-                                          <p:attrName>style.visibility</p:attrName>
-                                        </p:attrNameLst>
-                                      </p:cBhvr>
-                                      <p:to>
-                                        <p:strVal val="visible"/>
-                                      </p:to>
-                                    </p:set>
-                                    <p:animEffect transition="in" filter="wipe(right)">
-                                      <p:cBhvr>
-                                        <p:cTn id="37" dur="1000"/>
-                                        <p:tgtEl>
-                                          <p:spTgt spid="2"/>
                                         </p:tgtEl>
                                       </p:cBhvr>
                                     </p:animEffect>
@@ -9376,7 +9390,7 @@
   <p:clrMapOvr>
     <a:masterClrMapping/>
   </p:clrMapOvr>
-  <p:transition xmlns:p14="http://schemas.microsoft.com/office/powerpoint/2010/main" spd="slow">
+  <p:transition xmlns:p14="http://schemas.microsoft.com/office/powerpoint/2010/main" spd="slow" advClick="0">
     <p:fade/>
   </p:transition>
   <p:timing>
@@ -10793,9 +10807,18 @@
   <p:clrMapOvr>
     <a:masterClrMapping/>
   </p:clrMapOvr>
-  <p:transition xmlns:p14="http://schemas.microsoft.com/office/powerpoint/2010/main">
-    <p:fade/>
-  </p:transition>
+  <mc:AlternateContent xmlns:mc="http://schemas.openxmlformats.org/markup-compatibility/2006">
+    <mc:Choice xmlns:p14="http://schemas.microsoft.com/office/powerpoint/2010/main" Requires="p14">
+      <p:transition spd="slow" p14:dur="800" advClick="0">
+        <p:fade/>
+      </p:transition>
+    </mc:Choice>
+    <mc:Fallback>
+      <p:transition xmlns:p14="http://schemas.microsoft.com/office/powerpoint/2010/main" spd="slow" advClick="0">
+        <p:fade/>
+      </p:transition>
+    </mc:Fallback>
+  </mc:AlternateContent>
   <p:timing>
     <p:tnLst>
       <p:par>
@@ -12138,7 +12161,18 @@
   <p:clrMapOvr>
     <a:masterClrMapping/>
   </p:clrMapOvr>
-  <p:transition xmlns:p14="http://schemas.microsoft.com/office/powerpoint/2010/main"/>
+  <mc:AlternateContent xmlns:mc="http://schemas.openxmlformats.org/markup-compatibility/2006">
+    <mc:Choice xmlns:p14="http://schemas.microsoft.com/office/powerpoint/2010/main" Requires="p14">
+      <p:transition spd="med" p14:dur="700" advClick="0">
+        <p:fade/>
+      </p:transition>
+    </mc:Choice>
+    <mc:Fallback>
+      <p:transition xmlns:p14="http://schemas.microsoft.com/office/powerpoint/2010/main" spd="med" advClick="0">
+        <p:fade/>
+      </p:transition>
+    </mc:Fallback>
+  </mc:AlternateContent>
   <p:timing>
     <p:tnLst>
       <p:par>
@@ -13097,7 +13131,7 @@
   <p:clrMapOvr>
     <a:masterClrMapping/>
   </p:clrMapOvr>
-  <p:transition xmlns:p14="http://schemas.microsoft.com/office/powerpoint/2010/main" spd="med">
+  <p:transition xmlns:p14="http://schemas.microsoft.com/office/powerpoint/2010/main" spd="slow" advClick="0">
     <p:fade thruBlk="1"/>
   </p:transition>
   <p:timing>
@@ -15646,7 +15680,7 @@
           <a:graphicData uri="http://schemas.openxmlformats.org/presentationml/2006/ole">
             <mc:AlternateContent xmlns:mc="http://schemas.openxmlformats.org/markup-compatibility/2006">
               <mc:Choice xmlns:v="urn:schemas-microsoft-com:vml" Requires="v">
-                <p:oleObj spid="_x0000_s575526" name="Equation" r:id="rId4" imgW="1346040" imgH="406080" progId="Equation.DSMT4">
+                <p:oleObj spid="_x0000_s575529" name="Equation" r:id="rId4" imgW="1346040" imgH="406080" progId="Equation.DSMT4">
                   <p:embed/>
                 </p:oleObj>
               </mc:Choice>

</xml_diff>